<commit_message>
Worked on documentation changes for workflows
</commit_message>
<xml_diff>
--- a/docs/REDCap-ETL-Configuration-Guide-Diagrams.pptx
+++ b/docs/REDCap-ETL-Configuration-Guide-Diagrams.pptx
@@ -4,6 +4,9 @@
   <p:sldMasterIdLst>
     <p:sldMasterId id="2147483648" r:id="rId1"/>
   </p:sldMasterIdLst>
+  <p:notesMasterIdLst>
+    <p:notesMasterId r:id="rId4"/>
+  </p:notesMasterIdLst>
   <p:sldIdLst>
     <p:sldId id="258" r:id="rId2"/>
     <p:sldId id="259" r:id="rId3"/>
@@ -113,6 +116,565 @@
 </p:presentation>
 </file>
 
+<file path=ppt/notesMasters/notesMaster1.xml><?xml version="1.0" encoding="utf-8"?>
+<p:notesMaster xmlns:a="http://schemas.openxmlformats.org/drawingml/2006/main" xmlns:r="http://schemas.openxmlformats.org/officeDocument/2006/relationships" xmlns:p="http://schemas.openxmlformats.org/presentationml/2006/main">
+  <p:cSld>
+    <p:bg>
+      <p:bgRef idx="1001">
+        <a:schemeClr val="bg1"/>
+      </p:bgRef>
+    </p:bg>
+    <p:spTree>
+      <p:nvGrpSpPr>
+        <p:cNvPr id="1" name=""/>
+        <p:cNvGrpSpPr/>
+        <p:nvPr/>
+      </p:nvGrpSpPr>
+      <p:grpSpPr>
+        <a:xfrm>
+          <a:off x="0" y="0"/>
+          <a:ext cx="0" cy="0"/>
+          <a:chOff x="0" y="0"/>
+          <a:chExt cx="0" cy="0"/>
+        </a:xfrm>
+      </p:grpSpPr>
+      <p:sp>
+        <p:nvSpPr>
+          <p:cNvPr id="2" name="Header Placeholder 1"/>
+          <p:cNvSpPr>
+            <a:spLocks noGrp="1"/>
+          </p:cNvSpPr>
+          <p:nvPr>
+            <p:ph type="hdr" sz="quarter"/>
+          </p:nvPr>
+        </p:nvSpPr>
+        <p:spPr>
+          <a:xfrm>
+            <a:off x="0" y="0"/>
+            <a:ext cx="2971800" cy="458788"/>
+          </a:xfrm>
+          <a:prstGeom prst="rect">
+            <a:avLst/>
+          </a:prstGeom>
+        </p:spPr>
+        <p:txBody>
+          <a:bodyPr vert="horz" lIns="91440" tIns="45720" rIns="91440" bIns="45720" rtlCol="0"/>
+          <a:lstStyle>
+            <a:lvl1pPr algn="l">
+              <a:defRPr sz="1200"/>
+            </a:lvl1pPr>
+          </a:lstStyle>
+          <a:p>
+            <a:endParaRPr lang="en-US"/>
+          </a:p>
+        </p:txBody>
+      </p:sp>
+      <p:sp>
+        <p:nvSpPr>
+          <p:cNvPr id="3" name="Date Placeholder 2"/>
+          <p:cNvSpPr>
+            <a:spLocks noGrp="1"/>
+          </p:cNvSpPr>
+          <p:nvPr>
+            <p:ph type="dt" idx="1"/>
+          </p:nvPr>
+        </p:nvSpPr>
+        <p:spPr>
+          <a:xfrm>
+            <a:off x="3884613" y="0"/>
+            <a:ext cx="2971800" cy="458788"/>
+          </a:xfrm>
+          <a:prstGeom prst="rect">
+            <a:avLst/>
+          </a:prstGeom>
+        </p:spPr>
+        <p:txBody>
+          <a:bodyPr vert="horz" lIns="91440" tIns="45720" rIns="91440" bIns="45720" rtlCol="0"/>
+          <a:lstStyle>
+            <a:lvl1pPr algn="r">
+              <a:defRPr sz="1200"/>
+            </a:lvl1pPr>
+          </a:lstStyle>
+          <a:p>
+            <a:fld id="{7D850D39-6E52-475F-B493-BC6A01EEF9C7}" type="datetimeFigureOut">
+              <a:rPr lang="en-US" smtClean="0"/>
+              <a:t>11/9/2020</a:t>
+            </a:fld>
+            <a:endParaRPr lang="en-US"/>
+          </a:p>
+        </p:txBody>
+      </p:sp>
+      <p:sp>
+        <p:nvSpPr>
+          <p:cNvPr id="4" name="Slide Image Placeholder 3"/>
+          <p:cNvSpPr>
+            <a:spLocks noGrp="1" noRot="1" noChangeAspect="1"/>
+          </p:cNvSpPr>
+          <p:nvPr>
+            <p:ph type="sldImg" idx="2"/>
+          </p:nvPr>
+        </p:nvSpPr>
+        <p:spPr>
+          <a:xfrm>
+            <a:off x="685800" y="1143000"/>
+            <a:ext cx="5486400" cy="3086100"/>
+          </a:xfrm>
+          <a:prstGeom prst="rect">
+            <a:avLst/>
+          </a:prstGeom>
+          <a:noFill/>
+          <a:ln w="12700">
+            <a:solidFill>
+              <a:prstClr val="black"/>
+            </a:solidFill>
+          </a:ln>
+        </p:spPr>
+        <p:txBody>
+          <a:bodyPr vert="horz" lIns="91440" tIns="45720" rIns="91440" bIns="45720" rtlCol="0" anchor="ctr"/>
+          <a:lstStyle/>
+          <a:p>
+            <a:endParaRPr lang="en-US"/>
+          </a:p>
+        </p:txBody>
+      </p:sp>
+      <p:sp>
+        <p:nvSpPr>
+          <p:cNvPr id="5" name="Notes Placeholder 4"/>
+          <p:cNvSpPr>
+            <a:spLocks noGrp="1"/>
+          </p:cNvSpPr>
+          <p:nvPr>
+            <p:ph type="body" sz="quarter" idx="3"/>
+          </p:nvPr>
+        </p:nvSpPr>
+        <p:spPr>
+          <a:xfrm>
+            <a:off x="685800" y="4400550"/>
+            <a:ext cx="5486400" cy="3600450"/>
+          </a:xfrm>
+          <a:prstGeom prst="rect">
+            <a:avLst/>
+          </a:prstGeom>
+        </p:spPr>
+        <p:txBody>
+          <a:bodyPr vert="horz" lIns="91440" tIns="45720" rIns="91440" bIns="45720" rtlCol="0"/>
+          <a:lstStyle/>
+          <a:p>
+            <a:pPr lvl="0"/>
+            <a:r>
+              <a:rPr lang="en-US"/>
+              <a:t>Click to edit Master text styles</a:t>
+            </a:r>
+          </a:p>
+          <a:p>
+            <a:pPr lvl="1"/>
+            <a:r>
+              <a:rPr lang="en-US"/>
+              <a:t>Second level</a:t>
+            </a:r>
+          </a:p>
+          <a:p>
+            <a:pPr lvl="2"/>
+            <a:r>
+              <a:rPr lang="en-US"/>
+              <a:t>Third level</a:t>
+            </a:r>
+          </a:p>
+          <a:p>
+            <a:pPr lvl="3"/>
+            <a:r>
+              <a:rPr lang="en-US"/>
+              <a:t>Fourth level</a:t>
+            </a:r>
+          </a:p>
+          <a:p>
+            <a:pPr lvl="4"/>
+            <a:r>
+              <a:rPr lang="en-US"/>
+              <a:t>Fifth level</a:t>
+            </a:r>
+          </a:p>
+        </p:txBody>
+      </p:sp>
+      <p:sp>
+        <p:nvSpPr>
+          <p:cNvPr id="6" name="Footer Placeholder 5"/>
+          <p:cNvSpPr>
+            <a:spLocks noGrp="1"/>
+          </p:cNvSpPr>
+          <p:nvPr>
+            <p:ph type="ftr" sz="quarter" idx="4"/>
+          </p:nvPr>
+        </p:nvSpPr>
+        <p:spPr>
+          <a:xfrm>
+            <a:off x="0" y="8685213"/>
+            <a:ext cx="2971800" cy="458787"/>
+          </a:xfrm>
+          <a:prstGeom prst="rect">
+            <a:avLst/>
+          </a:prstGeom>
+        </p:spPr>
+        <p:txBody>
+          <a:bodyPr vert="horz" lIns="91440" tIns="45720" rIns="91440" bIns="45720" rtlCol="0" anchor="b"/>
+          <a:lstStyle>
+            <a:lvl1pPr algn="l">
+              <a:defRPr sz="1200"/>
+            </a:lvl1pPr>
+          </a:lstStyle>
+          <a:p>
+            <a:endParaRPr lang="en-US"/>
+          </a:p>
+        </p:txBody>
+      </p:sp>
+      <p:sp>
+        <p:nvSpPr>
+          <p:cNvPr id="7" name="Slide Number Placeholder 6"/>
+          <p:cNvSpPr>
+            <a:spLocks noGrp="1"/>
+          </p:cNvSpPr>
+          <p:nvPr>
+            <p:ph type="sldNum" sz="quarter" idx="5"/>
+          </p:nvPr>
+        </p:nvSpPr>
+        <p:spPr>
+          <a:xfrm>
+            <a:off x="3884613" y="8685213"/>
+            <a:ext cx="2971800" cy="458787"/>
+          </a:xfrm>
+          <a:prstGeom prst="rect">
+            <a:avLst/>
+          </a:prstGeom>
+        </p:spPr>
+        <p:txBody>
+          <a:bodyPr vert="horz" lIns="91440" tIns="45720" rIns="91440" bIns="45720" rtlCol="0" anchor="b"/>
+          <a:lstStyle>
+            <a:lvl1pPr algn="r">
+              <a:defRPr sz="1200"/>
+            </a:lvl1pPr>
+          </a:lstStyle>
+          <a:p>
+            <a:fld id="{D15A8AB1-446C-4306-9AC8-EA6F1CAC3B1C}" type="slidenum">
+              <a:rPr lang="en-US" smtClean="0"/>
+              <a:t>‹#›</a:t>
+            </a:fld>
+            <a:endParaRPr lang="en-US"/>
+          </a:p>
+        </p:txBody>
+      </p:sp>
+    </p:spTree>
+    <p:extLst>
+      <p:ext uri="{BB962C8B-B14F-4D97-AF65-F5344CB8AC3E}">
+        <p14:creationId xmlns:p14="http://schemas.microsoft.com/office/powerpoint/2010/main" val="2004634104"/>
+      </p:ext>
+    </p:extLst>
+  </p:cSld>
+  <p:clrMap bg1="lt1" tx1="dk1" bg2="lt2" tx2="dk2" accent1="accent1" accent2="accent2" accent3="accent3" accent4="accent4" accent5="accent5" accent6="accent6" hlink="hlink" folHlink="folHlink"/>
+  <p:notesStyle>
+    <a:lvl1pPr marL="0" algn="l" defTabSz="914400" rtl="0" eaLnBrk="1" latinLnBrk="0" hangingPunct="1">
+      <a:defRPr sz="1200" kern="1200">
+        <a:solidFill>
+          <a:schemeClr val="tx1"/>
+        </a:solidFill>
+        <a:latin typeface="+mn-lt"/>
+        <a:ea typeface="+mn-ea"/>
+        <a:cs typeface="+mn-cs"/>
+      </a:defRPr>
+    </a:lvl1pPr>
+    <a:lvl2pPr marL="457200" algn="l" defTabSz="914400" rtl="0" eaLnBrk="1" latinLnBrk="0" hangingPunct="1">
+      <a:defRPr sz="1200" kern="1200">
+        <a:solidFill>
+          <a:schemeClr val="tx1"/>
+        </a:solidFill>
+        <a:latin typeface="+mn-lt"/>
+        <a:ea typeface="+mn-ea"/>
+        <a:cs typeface="+mn-cs"/>
+      </a:defRPr>
+    </a:lvl2pPr>
+    <a:lvl3pPr marL="914400" algn="l" defTabSz="914400" rtl="0" eaLnBrk="1" latinLnBrk="0" hangingPunct="1">
+      <a:defRPr sz="1200" kern="1200">
+        <a:solidFill>
+          <a:schemeClr val="tx1"/>
+        </a:solidFill>
+        <a:latin typeface="+mn-lt"/>
+        <a:ea typeface="+mn-ea"/>
+        <a:cs typeface="+mn-cs"/>
+      </a:defRPr>
+    </a:lvl3pPr>
+    <a:lvl4pPr marL="1371600" algn="l" defTabSz="914400" rtl="0" eaLnBrk="1" latinLnBrk="0" hangingPunct="1">
+      <a:defRPr sz="1200" kern="1200">
+        <a:solidFill>
+          <a:schemeClr val="tx1"/>
+        </a:solidFill>
+        <a:latin typeface="+mn-lt"/>
+        <a:ea typeface="+mn-ea"/>
+        <a:cs typeface="+mn-cs"/>
+      </a:defRPr>
+    </a:lvl4pPr>
+    <a:lvl5pPr marL="1828800" algn="l" defTabSz="914400" rtl="0" eaLnBrk="1" latinLnBrk="0" hangingPunct="1">
+      <a:defRPr sz="1200" kern="1200">
+        <a:solidFill>
+          <a:schemeClr val="tx1"/>
+        </a:solidFill>
+        <a:latin typeface="+mn-lt"/>
+        <a:ea typeface="+mn-ea"/>
+        <a:cs typeface="+mn-cs"/>
+      </a:defRPr>
+    </a:lvl5pPr>
+    <a:lvl6pPr marL="2286000" algn="l" defTabSz="914400" rtl="0" eaLnBrk="1" latinLnBrk="0" hangingPunct="1">
+      <a:defRPr sz="1200" kern="1200">
+        <a:solidFill>
+          <a:schemeClr val="tx1"/>
+        </a:solidFill>
+        <a:latin typeface="+mn-lt"/>
+        <a:ea typeface="+mn-ea"/>
+        <a:cs typeface="+mn-cs"/>
+      </a:defRPr>
+    </a:lvl6pPr>
+    <a:lvl7pPr marL="2743200" algn="l" defTabSz="914400" rtl="0" eaLnBrk="1" latinLnBrk="0" hangingPunct="1">
+      <a:defRPr sz="1200" kern="1200">
+        <a:solidFill>
+          <a:schemeClr val="tx1"/>
+        </a:solidFill>
+        <a:latin typeface="+mn-lt"/>
+        <a:ea typeface="+mn-ea"/>
+        <a:cs typeface="+mn-cs"/>
+      </a:defRPr>
+    </a:lvl7pPr>
+    <a:lvl8pPr marL="3200400" algn="l" defTabSz="914400" rtl="0" eaLnBrk="1" latinLnBrk="0" hangingPunct="1">
+      <a:defRPr sz="1200" kern="1200">
+        <a:solidFill>
+          <a:schemeClr val="tx1"/>
+        </a:solidFill>
+        <a:latin typeface="+mn-lt"/>
+        <a:ea typeface="+mn-ea"/>
+        <a:cs typeface="+mn-cs"/>
+      </a:defRPr>
+    </a:lvl8pPr>
+    <a:lvl9pPr marL="3657600" algn="l" defTabSz="914400" rtl="0" eaLnBrk="1" latinLnBrk="0" hangingPunct="1">
+      <a:defRPr sz="1200" kern="1200">
+        <a:solidFill>
+          <a:schemeClr val="tx1"/>
+        </a:solidFill>
+        <a:latin typeface="+mn-lt"/>
+        <a:ea typeface="+mn-ea"/>
+        <a:cs typeface="+mn-cs"/>
+      </a:defRPr>
+    </a:lvl9pPr>
+  </p:notesStyle>
+</p:notesMaster>
+</file>
+
+<file path=ppt/notesSlides/notesSlide1.xml><?xml version="1.0" encoding="utf-8"?>
+<p:notes xmlns:a="http://schemas.openxmlformats.org/drawingml/2006/main" xmlns:r="http://schemas.openxmlformats.org/officeDocument/2006/relationships" xmlns:p="http://schemas.openxmlformats.org/presentationml/2006/main">
+  <p:cSld>
+    <p:spTree>
+      <p:nvGrpSpPr>
+        <p:cNvPr id="1" name=""/>
+        <p:cNvGrpSpPr/>
+        <p:nvPr/>
+      </p:nvGrpSpPr>
+      <p:grpSpPr>
+        <a:xfrm>
+          <a:off x="0" y="0"/>
+          <a:ext cx="0" cy="0"/>
+          <a:chOff x="0" y="0"/>
+          <a:chExt cx="0" cy="0"/>
+        </a:xfrm>
+      </p:grpSpPr>
+      <p:sp>
+        <p:nvSpPr>
+          <p:cNvPr id="2" name="Slide Image Placeholder 1"/>
+          <p:cNvSpPr>
+            <a:spLocks noGrp="1" noRot="1" noChangeAspect="1"/>
+          </p:cNvSpPr>
+          <p:nvPr>
+            <p:ph type="sldImg"/>
+          </p:nvPr>
+        </p:nvSpPr>
+        <p:spPr/>
+      </p:sp>
+      <p:sp>
+        <p:nvSpPr>
+          <p:cNvPr id="3" name="Notes Placeholder 2"/>
+          <p:cNvSpPr>
+            <a:spLocks noGrp="1"/>
+          </p:cNvSpPr>
+          <p:nvPr>
+            <p:ph type="body" idx="1"/>
+          </p:nvPr>
+        </p:nvSpPr>
+        <p:spPr/>
+        <p:txBody>
+          <a:bodyPr/>
+          <a:lstStyle/>
+          <a:p>
+            <a:r>
+              <a:rPr lang="en-US" dirty="0"/>
+              <a:t>To extract as image: select all objects, right-click, and copy. Paste into Word as an image, and resize to a width of 4.5 inches.  Then, in Word, right-click on image, and select “Save as Picture…”. Save as a .</a:t>
+            </a:r>
+            <a:r>
+              <a:rPr lang="en-US" dirty="0" err="1"/>
+              <a:t>png</a:t>
+            </a:r>
+            <a:r>
+              <a:rPr lang="en-US" dirty="0"/>
+              <a:t> image. Save with name “REDCap-ETL-Task.png”.</a:t>
+            </a:r>
+          </a:p>
+        </p:txBody>
+      </p:sp>
+      <p:sp>
+        <p:nvSpPr>
+          <p:cNvPr id="4" name="Slide Number Placeholder 3"/>
+          <p:cNvSpPr>
+            <a:spLocks noGrp="1"/>
+          </p:cNvSpPr>
+          <p:nvPr>
+            <p:ph type="sldNum" sz="quarter" idx="5"/>
+          </p:nvPr>
+        </p:nvSpPr>
+        <p:spPr/>
+        <p:txBody>
+          <a:bodyPr/>
+          <a:lstStyle/>
+          <a:p>
+            <a:fld id="{D15A8AB1-446C-4306-9AC8-EA6F1CAC3B1C}" type="slidenum">
+              <a:rPr lang="en-US" smtClean="0"/>
+              <a:t>1</a:t>
+            </a:fld>
+            <a:endParaRPr lang="en-US"/>
+          </a:p>
+        </p:txBody>
+      </p:sp>
+    </p:spTree>
+    <p:extLst>
+      <p:ext uri="{BB962C8B-B14F-4D97-AF65-F5344CB8AC3E}">
+        <p14:creationId xmlns:p14="http://schemas.microsoft.com/office/powerpoint/2010/main" val="3907190844"/>
+      </p:ext>
+    </p:extLst>
+  </p:cSld>
+  <p:clrMapOvr>
+    <a:masterClrMapping/>
+  </p:clrMapOvr>
+</p:notes>
+</file>
+
+<file path=ppt/notesSlides/notesSlide2.xml><?xml version="1.0" encoding="utf-8"?>
+<p:notes xmlns:a="http://schemas.openxmlformats.org/drawingml/2006/main" xmlns:r="http://schemas.openxmlformats.org/officeDocument/2006/relationships" xmlns:p="http://schemas.openxmlformats.org/presentationml/2006/main">
+  <p:cSld>
+    <p:spTree>
+      <p:nvGrpSpPr>
+        <p:cNvPr id="1" name=""/>
+        <p:cNvGrpSpPr/>
+        <p:nvPr/>
+      </p:nvGrpSpPr>
+      <p:grpSpPr>
+        <a:xfrm>
+          <a:off x="0" y="0"/>
+          <a:ext cx="0" cy="0"/>
+          <a:chOff x="0" y="0"/>
+          <a:chExt cx="0" cy="0"/>
+        </a:xfrm>
+      </p:grpSpPr>
+      <p:sp>
+        <p:nvSpPr>
+          <p:cNvPr id="2" name="Slide Image Placeholder 1"/>
+          <p:cNvSpPr>
+            <a:spLocks noGrp="1" noRot="1" noChangeAspect="1"/>
+          </p:cNvSpPr>
+          <p:nvPr>
+            <p:ph type="sldImg"/>
+          </p:nvPr>
+        </p:nvSpPr>
+        <p:spPr/>
+      </p:sp>
+      <p:sp>
+        <p:nvSpPr>
+          <p:cNvPr id="3" name="Notes Placeholder 2"/>
+          <p:cNvSpPr>
+            <a:spLocks noGrp="1"/>
+          </p:cNvSpPr>
+          <p:nvPr>
+            <p:ph type="body" idx="1"/>
+          </p:nvPr>
+        </p:nvSpPr>
+        <p:spPr/>
+        <p:txBody>
+          <a:bodyPr/>
+          <a:lstStyle/>
+          <a:p>
+            <a:pPr marL="0" marR="0" lvl="0" indent="0" algn="l" defTabSz="914400" rtl="0" eaLnBrk="1" fontAlgn="auto" latinLnBrk="0" hangingPunct="1">
+              <a:lnSpc>
+                <a:spcPct val="100000"/>
+              </a:lnSpc>
+              <a:spcBef>
+                <a:spcPts val="0"/>
+              </a:spcBef>
+              <a:spcAft>
+                <a:spcPts val="0"/>
+              </a:spcAft>
+              <a:buClrTx/>
+              <a:buSzTx/>
+              <a:buFontTx/>
+              <a:buNone/>
+              <a:tabLst/>
+              <a:defRPr/>
+            </a:pPr>
+            <a:r>
+              <a:rPr lang="en-US" dirty="0"/>
+              <a:t>To extract as image: select all objects, right-click, and copy. Paste into Word as an image, and resize (right-click on image and select “Size and Position…) to a width of 4.5 inches.  Then, in Word, right-click on image, and select “Save as Picture…”. Save as a .</a:t>
+            </a:r>
+            <a:r>
+              <a:rPr lang="en-US" dirty="0" err="1"/>
+              <a:t>png</a:t>
+            </a:r>
+            <a:r>
+              <a:rPr lang="en-US" dirty="0"/>
+              <a:t> image. Save with name “REDCap-ETL-Workflow.png”.</a:t>
+            </a:r>
+          </a:p>
+          <a:p>
+            <a:endParaRPr lang="en-US" dirty="0"/>
+          </a:p>
+        </p:txBody>
+      </p:sp>
+      <p:sp>
+        <p:nvSpPr>
+          <p:cNvPr id="4" name="Slide Number Placeholder 3"/>
+          <p:cNvSpPr>
+            <a:spLocks noGrp="1"/>
+          </p:cNvSpPr>
+          <p:nvPr>
+            <p:ph type="sldNum" sz="quarter" idx="5"/>
+          </p:nvPr>
+        </p:nvSpPr>
+        <p:spPr/>
+        <p:txBody>
+          <a:bodyPr/>
+          <a:lstStyle/>
+          <a:p>
+            <a:fld id="{D15A8AB1-446C-4306-9AC8-EA6F1CAC3B1C}" type="slidenum">
+              <a:rPr lang="en-US" smtClean="0"/>
+              <a:t>2</a:t>
+            </a:fld>
+            <a:endParaRPr lang="en-US"/>
+          </a:p>
+        </p:txBody>
+      </p:sp>
+    </p:spTree>
+    <p:extLst>
+      <p:ext uri="{BB962C8B-B14F-4D97-AF65-F5344CB8AC3E}">
+        <p14:creationId xmlns:p14="http://schemas.microsoft.com/office/powerpoint/2010/main" val="1134877360"/>
+      </p:ext>
+    </p:extLst>
+  </p:cSld>
+  <p:clrMapOvr>
+    <a:masterClrMapping/>
+  </p:clrMapOvr>
+</p:notes>
+</file>
+
 <file path=ppt/slideLayouts/slideLayout1.xml><?xml version="1.0" encoding="utf-8"?>
 <p:sldLayout xmlns:a="http://schemas.openxmlformats.org/drawingml/2006/main" xmlns:r="http://schemas.openxmlformats.org/officeDocument/2006/relationships" xmlns:p="http://schemas.openxmlformats.org/presentationml/2006/main" type="title" preserve="1">
   <p:cSld name="Title Slide">
@@ -260,7 +822,7 @@
           <a:p>
             <a:fld id="{3891AD4C-6110-4E3E-ABB7-B60795A9E103}" type="datetimeFigureOut">
               <a:rPr lang="en-US" smtClean="0"/>
-              <a:t>11/5/2020</a:t>
+              <a:t>11/9/2020</a:t>
             </a:fld>
             <a:endParaRPr lang="en-US"/>
           </a:p>
@@ -458,7 +1020,7 @@
           <a:p>
             <a:fld id="{3891AD4C-6110-4E3E-ABB7-B60795A9E103}" type="datetimeFigureOut">
               <a:rPr lang="en-US" smtClean="0"/>
-              <a:t>11/5/2020</a:t>
+              <a:t>11/9/2020</a:t>
             </a:fld>
             <a:endParaRPr lang="en-US"/>
           </a:p>
@@ -666,7 +1228,7 @@
           <a:p>
             <a:fld id="{3891AD4C-6110-4E3E-ABB7-B60795A9E103}" type="datetimeFigureOut">
               <a:rPr lang="en-US" smtClean="0"/>
-              <a:t>11/5/2020</a:t>
+              <a:t>11/9/2020</a:t>
             </a:fld>
             <a:endParaRPr lang="en-US"/>
           </a:p>
@@ -864,7 +1426,7 @@
           <a:p>
             <a:fld id="{3891AD4C-6110-4E3E-ABB7-B60795A9E103}" type="datetimeFigureOut">
               <a:rPr lang="en-US" smtClean="0"/>
-              <a:t>11/5/2020</a:t>
+              <a:t>11/9/2020</a:t>
             </a:fld>
             <a:endParaRPr lang="en-US"/>
           </a:p>
@@ -1139,7 +1701,7 @@
           <a:p>
             <a:fld id="{3891AD4C-6110-4E3E-ABB7-B60795A9E103}" type="datetimeFigureOut">
               <a:rPr lang="en-US" smtClean="0"/>
-              <a:t>11/5/2020</a:t>
+              <a:t>11/9/2020</a:t>
             </a:fld>
             <a:endParaRPr lang="en-US"/>
           </a:p>
@@ -1404,7 +1966,7 @@
           <a:p>
             <a:fld id="{3891AD4C-6110-4E3E-ABB7-B60795A9E103}" type="datetimeFigureOut">
               <a:rPr lang="en-US" smtClean="0"/>
-              <a:t>11/5/2020</a:t>
+              <a:t>11/9/2020</a:t>
             </a:fld>
             <a:endParaRPr lang="en-US"/>
           </a:p>
@@ -1816,7 +2378,7 @@
           <a:p>
             <a:fld id="{3891AD4C-6110-4E3E-ABB7-B60795A9E103}" type="datetimeFigureOut">
               <a:rPr lang="en-US" smtClean="0"/>
-              <a:t>11/5/2020</a:t>
+              <a:t>11/9/2020</a:t>
             </a:fld>
             <a:endParaRPr lang="en-US"/>
           </a:p>
@@ -1957,7 +2519,7 @@
           <a:p>
             <a:fld id="{3891AD4C-6110-4E3E-ABB7-B60795A9E103}" type="datetimeFigureOut">
               <a:rPr lang="en-US" smtClean="0"/>
-              <a:t>11/5/2020</a:t>
+              <a:t>11/9/2020</a:t>
             </a:fld>
             <a:endParaRPr lang="en-US"/>
           </a:p>
@@ -2070,7 +2632,7 @@
           <a:p>
             <a:fld id="{3891AD4C-6110-4E3E-ABB7-B60795A9E103}" type="datetimeFigureOut">
               <a:rPr lang="en-US" smtClean="0"/>
-              <a:t>11/5/2020</a:t>
+              <a:t>11/9/2020</a:t>
             </a:fld>
             <a:endParaRPr lang="en-US"/>
           </a:p>
@@ -2381,7 +2943,7 @@
           <a:p>
             <a:fld id="{3891AD4C-6110-4E3E-ABB7-B60795A9E103}" type="datetimeFigureOut">
               <a:rPr lang="en-US" smtClean="0"/>
-              <a:t>11/5/2020</a:t>
+              <a:t>11/9/2020</a:t>
             </a:fld>
             <a:endParaRPr lang="en-US"/>
           </a:p>
@@ -2669,7 +3231,7 @@
           <a:p>
             <a:fld id="{3891AD4C-6110-4E3E-ABB7-B60795A9E103}" type="datetimeFigureOut">
               <a:rPr lang="en-US" smtClean="0"/>
-              <a:t>11/5/2020</a:t>
+              <a:t>11/9/2020</a:t>
             </a:fld>
             <a:endParaRPr lang="en-US"/>
           </a:p>
@@ -2910,7 +3472,7 @@
           <a:p>
             <a:fld id="{3891AD4C-6110-4E3E-ABB7-B60795A9E103}" type="datetimeFigureOut">
               <a:rPr lang="en-US" smtClean="0"/>
-              <a:t>11/5/2020</a:t>
+              <a:t>11/9/2020</a:t>
             </a:fld>
             <a:endParaRPr lang="en-US"/>
           </a:p>
@@ -3336,12 +3898,14 @@
               </a:ext>
             </a:extLst>
           </p:cNvPr>
-          <p:cNvSpPr/>
+          <p:cNvSpPr>
+            <a:spLocks noChangeAspect="1"/>
+          </p:cNvSpPr>
           <p:nvPr/>
         </p:nvSpPr>
         <p:spPr>
           <a:xfrm>
-            <a:off x="3905250" y="1552575"/>
+            <a:off x="3952875" y="933450"/>
             <a:ext cx="3886200" cy="3286125"/>
           </a:xfrm>
           <a:prstGeom prst="roundRect">
@@ -3433,12 +3997,14 @@
               </a:ext>
             </a:extLst>
           </p:cNvPr>
-          <p:cNvSpPr/>
+          <p:cNvSpPr>
+            <a:spLocks noChangeAspect="1"/>
+          </p:cNvSpPr>
           <p:nvPr/>
         </p:nvSpPr>
         <p:spPr>
           <a:xfrm>
-            <a:off x="1439850" y="2576877"/>
+            <a:off x="1420800" y="1976802"/>
             <a:ext cx="1643063" cy="1169170"/>
           </a:xfrm>
           <a:prstGeom prst="roundRect">
@@ -3521,12 +4087,14 @@
               </a:ext>
             </a:extLst>
           </p:cNvPr>
-          <p:cNvSpPr/>
+          <p:cNvSpPr>
+            <a:spLocks noChangeAspect="1"/>
+          </p:cNvSpPr>
           <p:nvPr/>
         </p:nvSpPr>
         <p:spPr>
           <a:xfrm>
-            <a:off x="1787485" y="3098661"/>
+            <a:off x="1768435" y="2498586"/>
             <a:ext cx="945319" cy="377964"/>
           </a:xfrm>
           <a:prstGeom prst="rect">
@@ -3586,12 +4154,14 @@
               </a:ext>
             </a:extLst>
           </p:cNvPr>
-          <p:cNvSpPr/>
+          <p:cNvSpPr>
+            <a:spLocks noChangeAspect="1"/>
+          </p:cNvSpPr>
           <p:nvPr/>
         </p:nvSpPr>
         <p:spPr>
           <a:xfrm>
-            <a:off x="8880280" y="2800110"/>
+            <a:off x="8927905" y="2180985"/>
             <a:ext cx="1463870" cy="1024467"/>
           </a:xfrm>
           <a:prstGeom prst="can">
@@ -3668,7 +4238,7 @@
             </a:extLst>
           </p:cNvPr>
           <p:cNvCxnSpPr>
-            <a:cxnSpLocks/>
+            <a:cxnSpLocks noChangeAspect="1"/>
             <a:stCxn id="6" idx="3"/>
             <a:endCxn id="57" idx="1"/>
           </p:cNvCxnSpPr>
@@ -3676,8 +4246,8 @@
         </p:nvCxnSpPr>
         <p:spPr>
           <a:xfrm>
-            <a:off x="2732804" y="3287643"/>
-            <a:ext cx="1751981" cy="24062"/>
+            <a:off x="2713754" y="2687568"/>
+            <a:ext cx="1818656" cy="5012"/>
           </a:xfrm>
           <a:prstGeom prst="straightConnector1">
             <a:avLst/>
@@ -3705,7 +4275,7 @@
             </a:extLst>
           </p:cNvPr>
           <p:cNvCxnSpPr>
-            <a:cxnSpLocks/>
+            <a:cxnSpLocks noChangeAspect="1"/>
             <a:stCxn id="57" idx="3"/>
             <a:endCxn id="19" idx="2"/>
           </p:cNvCxnSpPr>
@@ -3713,7 +4283,7 @@
         </p:nvCxnSpPr>
         <p:spPr>
           <a:xfrm>
-            <a:off x="7177185" y="3311705"/>
+            <a:off x="7224810" y="2692580"/>
             <a:ext cx="1703095" cy="639"/>
           </a:xfrm>
           <a:prstGeom prst="straightConnector1">
@@ -3742,12 +4312,14 @@
               </a:ext>
             </a:extLst>
           </p:cNvPr>
-          <p:cNvSpPr/>
+          <p:cNvSpPr>
+            <a:spLocks noChangeAspect="1"/>
+          </p:cNvSpPr>
           <p:nvPr/>
         </p:nvSpPr>
         <p:spPr>
           <a:xfrm>
-            <a:off x="4484785" y="2194284"/>
+            <a:off x="4532410" y="1575159"/>
             <a:ext cx="2692400" cy="2234841"/>
           </a:xfrm>
           <a:prstGeom prst="roundRect">
@@ -3793,10 +4365,10 @@
               <a:defRPr/>
             </a:pPr>
             <a:r>
-              <a:rPr lang="en-US" kern="0" dirty="0"/>
-              <a:t>Data Transformation</a:t>
-            </a:r>
-            <a:endParaRPr kumimoji="0" lang="en-US" sz="1800" b="0" i="0" u="none" strike="noStrike" kern="0" cap="none" spc="0" normalizeH="0" baseline="0" noProof="0" dirty="0">
+              <a:rPr lang="en-US" b="1" kern="0" dirty="0"/>
+              <a:t>Transform</a:t>
+            </a:r>
+            <a:endParaRPr kumimoji="0" lang="en-US" sz="1800" b="1" i="0" u="none" strike="noStrike" kern="0" cap="none" spc="0" normalizeH="0" baseline="0" noProof="0" dirty="0">
               <a:ln>
                 <a:noFill/>
               </a:ln>
@@ -3818,12 +4390,14 @@
               </a:ext>
             </a:extLst>
           </p:cNvPr>
-          <p:cNvSpPr/>
+          <p:cNvSpPr>
+            <a:spLocks noChangeAspect="1"/>
+          </p:cNvSpPr>
           <p:nvPr/>
         </p:nvSpPr>
         <p:spPr>
           <a:xfrm>
-            <a:off x="4611783" y="2708656"/>
+            <a:off x="4659408" y="2089531"/>
             <a:ext cx="1050878" cy="770048"/>
           </a:xfrm>
           <a:prstGeom prst="rect">
@@ -3895,12 +4469,14 @@
               </a:ext>
             </a:extLst>
           </p:cNvPr>
-          <p:cNvSpPr/>
+          <p:cNvSpPr>
+            <a:spLocks noChangeAspect="1"/>
+          </p:cNvSpPr>
           <p:nvPr/>
         </p:nvSpPr>
         <p:spPr>
           <a:xfrm>
-            <a:off x="6406644" y="2946725"/>
+            <a:off x="6454269" y="2327600"/>
             <a:ext cx="525440" cy="534169"/>
           </a:xfrm>
           <a:prstGeom prst="rect">
@@ -3972,12 +4548,14 @@
               </a:ext>
             </a:extLst>
           </p:cNvPr>
-          <p:cNvSpPr/>
+          <p:cNvSpPr>
+            <a:spLocks noChangeAspect="1"/>
+          </p:cNvSpPr>
           <p:nvPr/>
         </p:nvSpPr>
         <p:spPr>
           <a:xfrm>
-            <a:off x="6472253" y="2306889"/>
+            <a:off x="6519878" y="1687764"/>
             <a:ext cx="394223" cy="510068"/>
           </a:xfrm>
           <a:prstGeom prst="rect">
@@ -4049,12 +4627,14 @@
               </a:ext>
             </a:extLst>
           </p:cNvPr>
-          <p:cNvSpPr/>
+          <p:cNvSpPr>
+            <a:spLocks noChangeAspect="1"/>
+          </p:cNvSpPr>
           <p:nvPr/>
         </p:nvSpPr>
         <p:spPr>
           <a:xfrm>
-            <a:off x="6472253" y="3618958"/>
+            <a:off x="6519878" y="2999833"/>
             <a:ext cx="394227" cy="306639"/>
           </a:xfrm>
           <a:prstGeom prst="rect">
@@ -4127,6 +4707,7 @@
             </a:extLst>
           </p:cNvPr>
           <p:cNvCxnSpPr>
+            <a:cxnSpLocks noChangeAspect="1"/>
             <a:stCxn id="58" idx="3"/>
             <a:endCxn id="60" idx="1"/>
           </p:cNvCxnSpPr>
@@ -4134,7 +4715,7 @@
         </p:nvCxnSpPr>
         <p:spPr>
           <a:xfrm flipV="1">
-            <a:off x="5662661" y="2561923"/>
+            <a:off x="5710286" y="1942798"/>
             <a:ext cx="809592" cy="531757"/>
           </a:xfrm>
           <a:prstGeom prst="straightConnector1">
@@ -4164,6 +4745,7 @@
             </a:extLst>
           </p:cNvPr>
           <p:cNvCxnSpPr>
+            <a:cxnSpLocks noChangeAspect="1"/>
             <a:stCxn id="58" idx="3"/>
             <a:endCxn id="59" idx="1"/>
           </p:cNvCxnSpPr>
@@ -4171,7 +4753,7 @@
         </p:nvCxnSpPr>
         <p:spPr>
           <a:xfrm>
-            <a:off x="5662661" y="3093680"/>
+            <a:off x="5710286" y="2474555"/>
             <a:ext cx="743983" cy="120130"/>
           </a:xfrm>
           <a:prstGeom prst="straightConnector1">
@@ -4201,6 +4783,7 @@
             </a:extLst>
           </p:cNvPr>
           <p:cNvCxnSpPr>
+            <a:cxnSpLocks noChangeAspect="1"/>
             <a:stCxn id="58" idx="3"/>
             <a:endCxn id="61" idx="1"/>
           </p:cNvCxnSpPr>
@@ -4208,7 +4791,7 @@
         </p:nvCxnSpPr>
         <p:spPr>
           <a:xfrm>
-            <a:off x="5662661" y="3093680"/>
+            <a:off x="5710286" y="2474555"/>
             <a:ext cx="809592" cy="678598"/>
           </a:xfrm>
           <a:prstGeom prst="straightConnector1">
@@ -4237,12 +4820,14 @@
               </a:ext>
             </a:extLst>
           </p:cNvPr>
-          <p:cNvSpPr/>
+          <p:cNvSpPr>
+            <a:spLocks noChangeAspect="1"/>
+          </p:cNvSpPr>
           <p:nvPr/>
         </p:nvSpPr>
         <p:spPr>
           <a:xfrm>
-            <a:off x="2655987" y="5295900"/>
+            <a:off x="2617887" y="4676775"/>
             <a:ext cx="6611837" cy="1361436"/>
           </a:xfrm>
           <a:prstGeom prst="roundRect">
@@ -4292,7 +4877,7 @@
                   </a:schemeClr>
                 </a:solidFill>
               </a:rPr>
-              <a:t>Configuration</a:t>
+              <a:t>Task Configuration</a:t>
             </a:r>
           </a:p>
         </p:txBody>
@@ -4306,12 +4891,14 @@
               </a:ext>
             </a:extLst>
           </p:cNvPr>
-          <p:cNvSpPr/>
+          <p:cNvSpPr>
+            <a:spLocks noChangeAspect="1"/>
+          </p:cNvSpPr>
           <p:nvPr/>
         </p:nvSpPr>
         <p:spPr>
           <a:xfrm>
-            <a:off x="2847976" y="5528180"/>
+            <a:off x="2809876" y="4909055"/>
             <a:ext cx="1952625" cy="641664"/>
           </a:xfrm>
           <a:prstGeom prst="rect">
@@ -4397,12 +4984,14 @@
               </a:ext>
             </a:extLst>
           </p:cNvPr>
-          <p:cNvSpPr/>
+          <p:cNvSpPr>
+            <a:spLocks noChangeAspect="1"/>
+          </p:cNvSpPr>
           <p:nvPr/>
         </p:nvSpPr>
         <p:spPr>
           <a:xfrm>
-            <a:off x="4973540" y="5528180"/>
+            <a:off x="4935440" y="4909055"/>
             <a:ext cx="1952625" cy="620774"/>
           </a:xfrm>
           <a:prstGeom prst="rect">
@@ -4458,12 +5047,14 @@
               </a:ext>
             </a:extLst>
           </p:cNvPr>
-          <p:cNvSpPr/>
+          <p:cNvSpPr>
+            <a:spLocks noChangeAspect="1"/>
+          </p:cNvSpPr>
           <p:nvPr/>
         </p:nvSpPr>
         <p:spPr>
           <a:xfrm>
-            <a:off x="7099104" y="5528179"/>
+            <a:off x="7061004" y="4909054"/>
             <a:ext cx="1952625" cy="620775"/>
           </a:xfrm>
           <a:prstGeom prst="rect">
@@ -4520,7 +5111,7 @@
             </a:extLst>
           </p:cNvPr>
           <p:cNvCxnSpPr>
-            <a:cxnSpLocks/>
+            <a:cxnSpLocks noChangeAspect="1"/>
             <a:stCxn id="6" idx="2"/>
             <a:endCxn id="79" idx="0"/>
           </p:cNvCxnSpPr>
@@ -4528,8 +5119,8 @@
         </p:nvCxnSpPr>
         <p:spPr>
           <a:xfrm>
-            <a:off x="2260145" y="3476625"/>
-            <a:ext cx="1564144" cy="2051555"/>
+            <a:off x="2241095" y="2876550"/>
+            <a:ext cx="1545094" cy="2032505"/>
           </a:xfrm>
           <a:prstGeom prst="line">
             <a:avLst/>
@@ -4568,7 +5159,7 @@
             </a:extLst>
           </p:cNvPr>
           <p:cNvCxnSpPr>
-            <a:cxnSpLocks/>
+            <a:cxnSpLocks noChangeAspect="1"/>
             <a:stCxn id="57" idx="2"/>
             <a:endCxn id="81" idx="0"/>
           </p:cNvCxnSpPr>
@@ -4576,8 +5167,8 @@
         </p:nvCxnSpPr>
         <p:spPr>
           <a:xfrm>
-            <a:off x="5830985" y="4429125"/>
-            <a:ext cx="118868" cy="1099055"/>
+            <a:off x="5878610" y="3810000"/>
+            <a:ext cx="33143" cy="1099055"/>
           </a:xfrm>
           <a:prstGeom prst="line">
             <a:avLst/>
@@ -4616,7 +5207,7 @@
             </a:extLst>
           </p:cNvPr>
           <p:cNvCxnSpPr>
-            <a:cxnSpLocks/>
+            <a:cxnSpLocks noChangeAspect="1"/>
             <a:stCxn id="19" idx="3"/>
             <a:endCxn id="83" idx="0"/>
           </p:cNvCxnSpPr>
@@ -4624,8 +5215,8 @@
         </p:nvCxnSpPr>
         <p:spPr>
           <a:xfrm flipH="1">
-            <a:off x="8075417" y="3824577"/>
-            <a:ext cx="1536798" cy="1703602"/>
+            <a:off x="8037317" y="3205452"/>
+            <a:ext cx="1622523" cy="1703602"/>
           </a:xfrm>
           <a:prstGeom prst="line">
             <a:avLst/>
@@ -4654,6 +5245,76 @@
           </a:fontRef>
         </p:style>
       </p:cxnSp>
+      <p:sp>
+        <p:nvSpPr>
+          <p:cNvPr id="99" name="TextBox 98">
+            <a:extLst>
+              <a:ext uri="{FF2B5EF4-FFF2-40B4-BE49-F238E27FC236}">
+                <a16:creationId xmlns:a16="http://schemas.microsoft.com/office/drawing/2014/main" id="{F7D5C0C8-8343-41A9-A6E5-06174FCC9DA0}"/>
+              </a:ext>
+            </a:extLst>
+          </p:cNvPr>
+          <p:cNvSpPr txBox="1"/>
+          <p:nvPr/>
+        </p:nvSpPr>
+        <p:spPr>
+          <a:xfrm>
+            <a:off x="3096036" y="2349954"/>
+            <a:ext cx="846450" cy="369332"/>
+          </a:xfrm>
+          <a:prstGeom prst="rect">
+            <a:avLst/>
+          </a:prstGeom>
+          <a:noFill/>
+        </p:spPr>
+        <p:txBody>
+          <a:bodyPr wrap="none" rtlCol="0">
+            <a:spAutoFit/>
+          </a:bodyPr>
+          <a:lstStyle/>
+          <a:p>
+            <a:r>
+              <a:rPr lang="en-US" b="1" dirty="0"/>
+              <a:t>Extract</a:t>
+            </a:r>
+          </a:p>
+        </p:txBody>
+      </p:sp>
+      <p:sp>
+        <p:nvSpPr>
+          <p:cNvPr id="101" name="TextBox 100">
+            <a:extLst>
+              <a:ext uri="{FF2B5EF4-FFF2-40B4-BE49-F238E27FC236}">
+                <a16:creationId xmlns:a16="http://schemas.microsoft.com/office/drawing/2014/main" id="{00FC2C6B-8457-44E5-BAF7-CB04644C86AD}"/>
+              </a:ext>
+            </a:extLst>
+          </p:cNvPr>
+          <p:cNvSpPr txBox="1"/>
+          <p:nvPr/>
+        </p:nvSpPr>
+        <p:spPr>
+          <a:xfrm>
+            <a:off x="8003627" y="2349954"/>
+            <a:ext cx="643125" cy="369332"/>
+          </a:xfrm>
+          <a:prstGeom prst="rect">
+            <a:avLst/>
+          </a:prstGeom>
+          <a:noFill/>
+        </p:spPr>
+        <p:txBody>
+          <a:bodyPr wrap="none" rtlCol="0">
+            <a:spAutoFit/>
+          </a:bodyPr>
+          <a:lstStyle/>
+          <a:p>
+            <a:r>
+              <a:rPr lang="en-US" b="1" dirty="0"/>
+              <a:t>Load</a:t>
+            </a:r>
+          </a:p>
+        </p:txBody>
+      </p:sp>
     </p:spTree>
     <p:extLst>
       <p:ext uri="{BB962C8B-B14F-4D97-AF65-F5344CB8AC3E}">
@@ -6394,4 +7055,299 @@
     </a:ext>
   </a:extLst>
 </a:theme>
+</file>
+
+<file path=ppt/theme/theme2.xml><?xml version="1.0" encoding="utf-8"?>
+<a:theme xmlns:a="http://schemas.openxmlformats.org/drawingml/2006/main" name="Office Theme">
+  <a:themeElements>
+    <a:clrScheme name="Office">
+      <a:dk1>
+        <a:sysClr val="windowText" lastClr="000000"/>
+      </a:dk1>
+      <a:lt1>
+        <a:sysClr val="window" lastClr="FFFFFF"/>
+      </a:lt1>
+      <a:dk2>
+        <a:srgbClr val="44546A"/>
+      </a:dk2>
+      <a:lt2>
+        <a:srgbClr val="E7E6E6"/>
+      </a:lt2>
+      <a:accent1>
+        <a:srgbClr val="4472C4"/>
+      </a:accent1>
+      <a:accent2>
+        <a:srgbClr val="ED7D31"/>
+      </a:accent2>
+      <a:accent3>
+        <a:srgbClr val="A5A5A5"/>
+      </a:accent3>
+      <a:accent4>
+        <a:srgbClr val="FFC000"/>
+      </a:accent4>
+      <a:accent5>
+        <a:srgbClr val="5B9BD5"/>
+      </a:accent5>
+      <a:accent6>
+        <a:srgbClr val="70AD47"/>
+      </a:accent6>
+      <a:hlink>
+        <a:srgbClr val="0563C1"/>
+      </a:hlink>
+      <a:folHlink>
+        <a:srgbClr val="954F72"/>
+      </a:folHlink>
+    </a:clrScheme>
+    <a:fontScheme name="Office">
+      <a:majorFont>
+        <a:latin typeface="Calibri Light" panose="020F0302020204030204"/>
+        <a:ea typeface=""/>
+        <a:cs typeface=""/>
+        <a:font script="Jpan" typeface="游ゴシック Light"/>
+        <a:font script="Hang" typeface="맑은 고딕"/>
+        <a:font script="Hans" typeface="等线 Light"/>
+        <a:font script="Hant" typeface="新細明體"/>
+        <a:font script="Arab" typeface="Times New Roman"/>
+        <a:font script="Hebr" typeface="Times New Roman"/>
+        <a:font script="Thai" typeface="Angsana New"/>
+        <a:font script="Ethi" typeface="Nyala"/>
+        <a:font script="Beng" typeface="Vrinda"/>
+        <a:font script="Gujr" typeface="Shruti"/>
+        <a:font script="Khmr" typeface="MoolBoran"/>
+        <a:font script="Knda" typeface="Tunga"/>
+        <a:font script="Guru" typeface="Raavi"/>
+        <a:font script="Cans" typeface="Euphemia"/>
+        <a:font script="Cher" typeface="Plantagenet Cherokee"/>
+        <a:font script="Yiii" typeface="Microsoft Yi Baiti"/>
+        <a:font script="Tibt" typeface="Microsoft Himalaya"/>
+        <a:font script="Thaa" typeface="MV Boli"/>
+        <a:font script="Deva" typeface="Mangal"/>
+        <a:font script="Telu" typeface="Gautami"/>
+        <a:font script="Taml" typeface="Latha"/>
+        <a:font script="Syrc" typeface="Estrangelo Edessa"/>
+        <a:font script="Orya" typeface="Kalinga"/>
+        <a:font script="Mlym" typeface="Kartika"/>
+        <a:font script="Laoo" typeface="DokChampa"/>
+        <a:font script="Sinh" typeface="Iskoola Pota"/>
+        <a:font script="Mong" typeface="Mongolian Baiti"/>
+        <a:font script="Viet" typeface="Times New Roman"/>
+        <a:font script="Uigh" typeface="Microsoft Uighur"/>
+        <a:font script="Geor" typeface="Sylfaen"/>
+        <a:font script="Armn" typeface="Arial"/>
+        <a:font script="Bugi" typeface="Leelawadee UI"/>
+        <a:font script="Bopo" typeface="Microsoft JhengHei"/>
+        <a:font script="Java" typeface="Javanese Text"/>
+        <a:font script="Lisu" typeface="Segoe UI"/>
+        <a:font script="Mymr" typeface="Myanmar Text"/>
+        <a:font script="Nkoo" typeface="Ebrima"/>
+        <a:font script="Olck" typeface="Nirmala UI"/>
+        <a:font script="Osma" typeface="Ebrima"/>
+        <a:font script="Phag" typeface="Phagspa"/>
+        <a:font script="Syrn" typeface="Estrangelo Edessa"/>
+        <a:font script="Syrj" typeface="Estrangelo Edessa"/>
+        <a:font script="Syre" typeface="Estrangelo Edessa"/>
+        <a:font script="Sora" typeface="Nirmala UI"/>
+        <a:font script="Tale" typeface="Microsoft Tai Le"/>
+        <a:font script="Talu" typeface="Microsoft New Tai Lue"/>
+        <a:font script="Tfng" typeface="Ebrima"/>
+      </a:majorFont>
+      <a:minorFont>
+        <a:latin typeface="Calibri" panose="020F0502020204030204"/>
+        <a:ea typeface=""/>
+        <a:cs typeface=""/>
+        <a:font script="Jpan" typeface="游ゴシック"/>
+        <a:font script="Hang" typeface="맑은 고딕"/>
+        <a:font script="Hans" typeface="等线"/>
+        <a:font script="Hant" typeface="新細明體"/>
+        <a:font script="Arab" typeface="Arial"/>
+        <a:font script="Hebr" typeface="Arial"/>
+        <a:font script="Thai" typeface="Cordia New"/>
+        <a:font script="Ethi" typeface="Nyala"/>
+        <a:font script="Beng" typeface="Vrinda"/>
+        <a:font script="Gujr" typeface="Shruti"/>
+        <a:font script="Khmr" typeface="DaunPenh"/>
+        <a:font script="Knda" typeface="Tunga"/>
+        <a:font script="Guru" typeface="Raavi"/>
+        <a:font script="Cans" typeface="Euphemia"/>
+        <a:font script="Cher" typeface="Plantagenet Cherokee"/>
+        <a:font script="Yiii" typeface="Microsoft Yi Baiti"/>
+        <a:font script="Tibt" typeface="Microsoft Himalaya"/>
+        <a:font script="Thaa" typeface="MV Boli"/>
+        <a:font script="Deva" typeface="Mangal"/>
+        <a:font script="Telu" typeface="Gautami"/>
+        <a:font script="Taml" typeface="Latha"/>
+        <a:font script="Syrc" typeface="Estrangelo Edessa"/>
+        <a:font script="Orya" typeface="Kalinga"/>
+        <a:font script="Mlym" typeface="Kartika"/>
+        <a:font script="Laoo" typeface="DokChampa"/>
+        <a:font script="Sinh" typeface="Iskoola Pota"/>
+        <a:font script="Mong" typeface="Mongolian Baiti"/>
+        <a:font script="Viet" typeface="Arial"/>
+        <a:font script="Uigh" typeface="Microsoft Uighur"/>
+        <a:font script="Geor" typeface="Sylfaen"/>
+        <a:font script="Armn" typeface="Arial"/>
+        <a:font script="Bugi" typeface="Leelawadee UI"/>
+        <a:font script="Bopo" typeface="Microsoft JhengHei"/>
+        <a:font script="Java" typeface="Javanese Text"/>
+        <a:font script="Lisu" typeface="Segoe UI"/>
+        <a:font script="Mymr" typeface="Myanmar Text"/>
+        <a:font script="Nkoo" typeface="Ebrima"/>
+        <a:font script="Olck" typeface="Nirmala UI"/>
+        <a:font script="Osma" typeface="Ebrima"/>
+        <a:font script="Phag" typeface="Phagspa"/>
+        <a:font script="Syrn" typeface="Estrangelo Edessa"/>
+        <a:font script="Syrj" typeface="Estrangelo Edessa"/>
+        <a:font script="Syre" typeface="Estrangelo Edessa"/>
+        <a:font script="Sora" typeface="Nirmala UI"/>
+        <a:font script="Tale" typeface="Microsoft Tai Le"/>
+        <a:font script="Talu" typeface="Microsoft New Tai Lue"/>
+        <a:font script="Tfng" typeface="Ebrima"/>
+      </a:minorFont>
+    </a:fontScheme>
+    <a:fmtScheme name="Office">
+      <a:fillStyleLst>
+        <a:solidFill>
+          <a:schemeClr val="phClr"/>
+        </a:solidFill>
+        <a:gradFill rotWithShape="1">
+          <a:gsLst>
+            <a:gs pos="0">
+              <a:schemeClr val="phClr">
+                <a:lumMod val="110000"/>
+                <a:satMod val="105000"/>
+                <a:tint val="67000"/>
+              </a:schemeClr>
+            </a:gs>
+            <a:gs pos="50000">
+              <a:schemeClr val="phClr">
+                <a:lumMod val="105000"/>
+                <a:satMod val="103000"/>
+                <a:tint val="73000"/>
+              </a:schemeClr>
+            </a:gs>
+            <a:gs pos="100000">
+              <a:schemeClr val="phClr">
+                <a:lumMod val="105000"/>
+                <a:satMod val="109000"/>
+                <a:tint val="81000"/>
+              </a:schemeClr>
+            </a:gs>
+          </a:gsLst>
+          <a:lin ang="5400000" scaled="0"/>
+        </a:gradFill>
+        <a:gradFill rotWithShape="1">
+          <a:gsLst>
+            <a:gs pos="0">
+              <a:schemeClr val="phClr">
+                <a:satMod val="103000"/>
+                <a:lumMod val="102000"/>
+                <a:tint val="94000"/>
+              </a:schemeClr>
+            </a:gs>
+            <a:gs pos="50000">
+              <a:schemeClr val="phClr">
+                <a:satMod val="110000"/>
+                <a:lumMod val="100000"/>
+                <a:shade val="100000"/>
+              </a:schemeClr>
+            </a:gs>
+            <a:gs pos="100000">
+              <a:schemeClr val="phClr">
+                <a:lumMod val="99000"/>
+                <a:satMod val="120000"/>
+                <a:shade val="78000"/>
+              </a:schemeClr>
+            </a:gs>
+          </a:gsLst>
+          <a:lin ang="5400000" scaled="0"/>
+        </a:gradFill>
+      </a:fillStyleLst>
+      <a:lnStyleLst>
+        <a:ln w="6350" cap="flat" cmpd="sng" algn="ctr">
+          <a:solidFill>
+            <a:schemeClr val="phClr"/>
+          </a:solidFill>
+          <a:prstDash val="solid"/>
+          <a:miter lim="800000"/>
+        </a:ln>
+        <a:ln w="12700" cap="flat" cmpd="sng" algn="ctr">
+          <a:solidFill>
+            <a:schemeClr val="phClr"/>
+          </a:solidFill>
+          <a:prstDash val="solid"/>
+          <a:miter lim="800000"/>
+        </a:ln>
+        <a:ln w="19050" cap="flat" cmpd="sng" algn="ctr">
+          <a:solidFill>
+            <a:schemeClr val="phClr"/>
+          </a:solidFill>
+          <a:prstDash val="solid"/>
+          <a:miter lim="800000"/>
+        </a:ln>
+      </a:lnStyleLst>
+      <a:effectStyleLst>
+        <a:effectStyle>
+          <a:effectLst/>
+        </a:effectStyle>
+        <a:effectStyle>
+          <a:effectLst/>
+        </a:effectStyle>
+        <a:effectStyle>
+          <a:effectLst>
+            <a:outerShdw blurRad="57150" dist="19050" dir="5400000" algn="ctr" rotWithShape="0">
+              <a:srgbClr val="000000">
+                <a:alpha val="63000"/>
+              </a:srgbClr>
+            </a:outerShdw>
+          </a:effectLst>
+        </a:effectStyle>
+      </a:effectStyleLst>
+      <a:bgFillStyleLst>
+        <a:solidFill>
+          <a:schemeClr val="phClr"/>
+        </a:solidFill>
+        <a:solidFill>
+          <a:schemeClr val="phClr">
+            <a:tint val="95000"/>
+            <a:satMod val="170000"/>
+          </a:schemeClr>
+        </a:solidFill>
+        <a:gradFill rotWithShape="1">
+          <a:gsLst>
+            <a:gs pos="0">
+              <a:schemeClr val="phClr">
+                <a:tint val="93000"/>
+                <a:satMod val="150000"/>
+                <a:shade val="98000"/>
+                <a:lumMod val="102000"/>
+              </a:schemeClr>
+            </a:gs>
+            <a:gs pos="50000">
+              <a:schemeClr val="phClr">
+                <a:tint val="98000"/>
+                <a:satMod val="130000"/>
+                <a:shade val="90000"/>
+                <a:lumMod val="103000"/>
+              </a:schemeClr>
+            </a:gs>
+            <a:gs pos="100000">
+              <a:schemeClr val="phClr">
+                <a:shade val="63000"/>
+                <a:satMod val="120000"/>
+              </a:schemeClr>
+            </a:gs>
+          </a:gsLst>
+          <a:lin ang="5400000" scaled="0"/>
+        </a:gradFill>
+      </a:bgFillStyleLst>
+    </a:fmtScheme>
+  </a:themeElements>
+  <a:objectDefaults/>
+  <a:extraClrSchemeLst/>
+  <a:extLst>
+    <a:ext uri="{05A4C25C-085E-4340-85A3-A5531E510DB2}">
+      <thm15:themeFamily xmlns:thm15="http://schemas.microsoft.com/office/thememl/2012/main" name="Office Theme" id="{62F939B6-93AF-4DB8-9C6B-D6C7DFDC589F}" vid="{4A3C46E8-61CC-4603-A589-7422A47A8E4A}"/>
+    </a:ext>
+  </a:extLst>
+</a:theme>
 </file>
</xml_diff>

<commit_message>
Updated task configuration diagram
</commit_message>
<xml_diff>
--- a/docs/REDCap-ETL-Configuration-Guide-Diagrams.pptx
+++ b/docs/REDCap-ETL-Configuration-Guide-Diagrams.pptx
@@ -198,7 +198,7 @@
           <a:p>
             <a:fld id="{7D850D39-6E52-475F-B493-BC6A01EEF9C7}" type="datetimeFigureOut">
               <a:rPr lang="en-US" smtClean="0"/>
-              <a:t>11/9/2020</a:t>
+              <a:t>6/15/2022</a:t>
             </a:fld>
             <a:endParaRPr lang="en-US"/>
           </a:p>
@@ -511,7 +511,7 @@
           <a:p>
             <a:r>
               <a:rPr lang="en-US" dirty="0"/>
-              <a:t>To extract as image: select all objects, right-click, and copy. Paste into Word as an image, and resize to a width of 4.5 inches.  Then, in Word, right-click on image, and select “Save as Picture…”. Save as a .</a:t>
+              <a:t>To extract as image: select all objects, right-click, and copy. Paste into Word as an image, and it resize to a width of 4.5 inches.  Then, in Word, right-click on image, and select “Save as Picture…”. Save as a .</a:t>
             </a:r>
             <a:r>
               <a:rPr lang="en-US" dirty="0" err="1"/>
@@ -822,7 +822,7 @@
           <a:p>
             <a:fld id="{3891AD4C-6110-4E3E-ABB7-B60795A9E103}" type="datetimeFigureOut">
               <a:rPr lang="en-US" smtClean="0"/>
-              <a:t>11/9/2020</a:t>
+              <a:t>6/15/2022</a:t>
             </a:fld>
             <a:endParaRPr lang="en-US"/>
           </a:p>
@@ -1020,7 +1020,7 @@
           <a:p>
             <a:fld id="{3891AD4C-6110-4E3E-ABB7-B60795A9E103}" type="datetimeFigureOut">
               <a:rPr lang="en-US" smtClean="0"/>
-              <a:t>11/9/2020</a:t>
+              <a:t>6/15/2022</a:t>
             </a:fld>
             <a:endParaRPr lang="en-US"/>
           </a:p>
@@ -1228,7 +1228,7 @@
           <a:p>
             <a:fld id="{3891AD4C-6110-4E3E-ABB7-B60795A9E103}" type="datetimeFigureOut">
               <a:rPr lang="en-US" smtClean="0"/>
-              <a:t>11/9/2020</a:t>
+              <a:t>6/15/2022</a:t>
             </a:fld>
             <a:endParaRPr lang="en-US"/>
           </a:p>
@@ -1426,7 +1426,7 @@
           <a:p>
             <a:fld id="{3891AD4C-6110-4E3E-ABB7-B60795A9E103}" type="datetimeFigureOut">
               <a:rPr lang="en-US" smtClean="0"/>
-              <a:t>11/9/2020</a:t>
+              <a:t>6/15/2022</a:t>
             </a:fld>
             <a:endParaRPr lang="en-US"/>
           </a:p>
@@ -1701,7 +1701,7 @@
           <a:p>
             <a:fld id="{3891AD4C-6110-4E3E-ABB7-B60795A9E103}" type="datetimeFigureOut">
               <a:rPr lang="en-US" smtClean="0"/>
-              <a:t>11/9/2020</a:t>
+              <a:t>6/15/2022</a:t>
             </a:fld>
             <a:endParaRPr lang="en-US"/>
           </a:p>
@@ -1966,7 +1966,7 @@
           <a:p>
             <a:fld id="{3891AD4C-6110-4E3E-ABB7-B60795A9E103}" type="datetimeFigureOut">
               <a:rPr lang="en-US" smtClean="0"/>
-              <a:t>11/9/2020</a:t>
+              <a:t>6/15/2022</a:t>
             </a:fld>
             <a:endParaRPr lang="en-US"/>
           </a:p>
@@ -2378,7 +2378,7 @@
           <a:p>
             <a:fld id="{3891AD4C-6110-4E3E-ABB7-B60795A9E103}" type="datetimeFigureOut">
               <a:rPr lang="en-US" smtClean="0"/>
-              <a:t>11/9/2020</a:t>
+              <a:t>6/15/2022</a:t>
             </a:fld>
             <a:endParaRPr lang="en-US"/>
           </a:p>
@@ -2519,7 +2519,7 @@
           <a:p>
             <a:fld id="{3891AD4C-6110-4E3E-ABB7-B60795A9E103}" type="datetimeFigureOut">
               <a:rPr lang="en-US" smtClean="0"/>
-              <a:t>11/9/2020</a:t>
+              <a:t>6/15/2022</a:t>
             </a:fld>
             <a:endParaRPr lang="en-US"/>
           </a:p>
@@ -2632,7 +2632,7 @@
           <a:p>
             <a:fld id="{3891AD4C-6110-4E3E-ABB7-B60795A9E103}" type="datetimeFigureOut">
               <a:rPr lang="en-US" smtClean="0"/>
-              <a:t>11/9/2020</a:t>
+              <a:t>6/15/2022</a:t>
             </a:fld>
             <a:endParaRPr lang="en-US"/>
           </a:p>
@@ -2943,7 +2943,7 @@
           <a:p>
             <a:fld id="{3891AD4C-6110-4E3E-ABB7-B60795A9E103}" type="datetimeFigureOut">
               <a:rPr lang="en-US" smtClean="0"/>
-              <a:t>11/9/2020</a:t>
+              <a:t>6/15/2022</a:t>
             </a:fld>
             <a:endParaRPr lang="en-US"/>
           </a:p>
@@ -3231,7 +3231,7 @@
           <a:p>
             <a:fld id="{3891AD4C-6110-4E3E-ABB7-B60795A9E103}" type="datetimeFigureOut">
               <a:rPr lang="en-US" smtClean="0"/>
-              <a:t>11/9/2020</a:t>
+              <a:t>6/15/2022</a:t>
             </a:fld>
             <a:endParaRPr lang="en-US"/>
           </a:p>
@@ -3472,7 +3472,7 @@
           <a:p>
             <a:fld id="{3891AD4C-6110-4E3E-ABB7-B60795A9E103}" type="datetimeFigureOut">
               <a:rPr lang="en-US" smtClean="0"/>
-              <a:t>11/9/2020</a:t>
+              <a:t>6/15/2022</a:t>
             </a:fld>
             <a:endParaRPr lang="en-US"/>
           </a:p>
@@ -4004,7 +4004,7 @@
         </p:nvSpPr>
         <p:spPr>
           <a:xfrm>
-            <a:off x="1420800" y="1976802"/>
+            <a:off x="792150" y="1976802"/>
             <a:ext cx="1643063" cy="1169170"/>
           </a:xfrm>
           <a:prstGeom prst="roundRect">
@@ -4094,7 +4094,7 @@
         </p:nvSpPr>
         <p:spPr>
           <a:xfrm>
-            <a:off x="1768435" y="2498586"/>
+            <a:off x="1139785" y="2498586"/>
             <a:ext cx="945319" cy="377964"/>
           </a:xfrm>
           <a:prstGeom prst="rect">
@@ -4246,8 +4246,8 @@
         </p:nvCxnSpPr>
         <p:spPr>
           <a:xfrm>
-            <a:off x="2713754" y="2687568"/>
-            <a:ext cx="1818656" cy="5012"/>
+            <a:off x="2085104" y="2687568"/>
+            <a:ext cx="2447306" cy="5012"/>
           </a:xfrm>
           <a:prstGeom prst="straightConnector1">
             <a:avLst/>
@@ -4397,7 +4397,7 @@
         </p:nvSpPr>
         <p:spPr>
           <a:xfrm>
-            <a:off x="4659408" y="2089531"/>
+            <a:off x="4773708" y="2089531"/>
             <a:ext cx="1050878" cy="770048"/>
           </a:xfrm>
           <a:prstGeom prst="rect">
@@ -4715,8 +4715,8 @@
         </p:nvCxnSpPr>
         <p:spPr>
           <a:xfrm flipV="1">
-            <a:off x="5710286" y="1942798"/>
-            <a:ext cx="809592" cy="531757"/>
+            <a:off x="5824586" y="1942798"/>
+            <a:ext cx="695292" cy="531757"/>
           </a:xfrm>
           <a:prstGeom prst="straightConnector1">
             <a:avLst/>
@@ -4753,8 +4753,8 @@
         </p:nvCxnSpPr>
         <p:spPr>
           <a:xfrm>
-            <a:off x="5710286" y="2474555"/>
-            <a:ext cx="743983" cy="120130"/>
+            <a:off x="5824586" y="2474555"/>
+            <a:ext cx="629683" cy="120130"/>
           </a:xfrm>
           <a:prstGeom prst="straightConnector1">
             <a:avLst/>
@@ -4791,8 +4791,8 @@
         </p:nvCxnSpPr>
         <p:spPr>
           <a:xfrm>
-            <a:off x="5710286" y="2474555"/>
-            <a:ext cx="809592" cy="678598"/>
+            <a:off x="5824586" y="2474555"/>
+            <a:ext cx="695292" cy="678598"/>
           </a:xfrm>
           <a:prstGeom prst="straightConnector1">
             <a:avLst/>
@@ -4827,8 +4827,8 @@
         </p:nvSpPr>
         <p:spPr>
           <a:xfrm>
-            <a:off x="2617887" y="4676775"/>
-            <a:ext cx="6611837" cy="1361436"/>
+            <a:off x="891540" y="4693613"/>
+            <a:ext cx="8364171" cy="1361436"/>
           </a:xfrm>
           <a:prstGeom prst="roundRect">
             <a:avLst/>
@@ -4898,7 +4898,7 @@
         </p:nvSpPr>
         <p:spPr>
           <a:xfrm>
-            <a:off x="2809876" y="4909055"/>
+            <a:off x="1130332" y="4888398"/>
             <a:ext cx="1952625" cy="641664"/>
           </a:xfrm>
           <a:prstGeom prst="rect">
@@ -4991,7 +4991,7 @@
         </p:nvSpPr>
         <p:spPr>
           <a:xfrm>
-            <a:off x="4935440" y="4909055"/>
+            <a:off x="4935330" y="4909055"/>
             <a:ext cx="1952625" cy="620774"/>
           </a:xfrm>
           <a:prstGeom prst="rect">
@@ -5054,7 +5054,7 @@
         </p:nvSpPr>
         <p:spPr>
           <a:xfrm>
-            <a:off x="7061004" y="4909054"/>
+            <a:off x="7065754" y="4909054"/>
             <a:ext cx="1952625" cy="620775"/>
           </a:xfrm>
           <a:prstGeom prst="rect">
@@ -5119,8 +5119,8 @@
         </p:nvCxnSpPr>
         <p:spPr>
           <a:xfrm>
-            <a:off x="2241095" y="2876550"/>
-            <a:ext cx="1545094" cy="2032505"/>
+            <a:off x="1612445" y="2876550"/>
+            <a:ext cx="494200" cy="2011848"/>
           </a:xfrm>
           <a:prstGeom prst="line">
             <a:avLst/>
@@ -5168,7 +5168,7 @@
         <p:spPr>
           <a:xfrm>
             <a:off x="5878610" y="3810000"/>
-            <a:ext cx="33143" cy="1099055"/>
+            <a:ext cx="33033" cy="1099055"/>
           </a:xfrm>
           <a:prstGeom prst="line">
             <a:avLst/>
@@ -5215,8 +5215,8 @@
         </p:nvCxnSpPr>
         <p:spPr>
           <a:xfrm flipH="1">
-            <a:off x="8037317" y="3205452"/>
-            <a:ext cx="1622523" cy="1703602"/>
+            <a:off x="8042067" y="3205452"/>
+            <a:ext cx="1617773" cy="1703602"/>
           </a:xfrm>
           <a:prstGeom prst="line">
             <a:avLst/>
@@ -5315,6 +5315,124 @@
           </a:p>
         </p:txBody>
       </p:sp>
+      <p:sp>
+        <p:nvSpPr>
+          <p:cNvPr id="25" name="Rectangle 24">
+            <a:extLst>
+              <a:ext uri="{FF2B5EF4-FFF2-40B4-BE49-F238E27FC236}">
+                <a16:creationId xmlns:a16="http://schemas.microsoft.com/office/drawing/2014/main" id="{32A7E27C-DA30-4B9C-87FD-FFB5FD8DA80F}"/>
+              </a:ext>
+            </a:extLst>
+          </p:cNvPr>
+          <p:cNvSpPr>
+            <a:spLocks noChangeAspect="1"/>
+          </p:cNvSpPr>
+          <p:nvPr/>
+        </p:nvSpPr>
+        <p:spPr>
+          <a:xfrm>
+            <a:off x="3260756" y="4891778"/>
+            <a:ext cx="1496775" cy="641664"/>
+          </a:xfrm>
+          <a:prstGeom prst="rect">
+            <a:avLst/>
+          </a:prstGeom>
+          <a:solidFill>
+            <a:schemeClr val="accent6">
+              <a:lumMod val="40000"/>
+              <a:lumOff val="60000"/>
+            </a:schemeClr>
+          </a:solidFill>
+          <a:ln>
+            <a:solidFill>
+              <a:schemeClr val="accent6">
+                <a:lumMod val="75000"/>
+              </a:schemeClr>
+            </a:solidFill>
+          </a:ln>
+        </p:spPr>
+        <p:style>
+          <a:lnRef idx="2">
+            <a:schemeClr val="accent1">
+              <a:shade val="50000"/>
+            </a:schemeClr>
+          </a:lnRef>
+          <a:fillRef idx="1">
+            <a:schemeClr val="accent1"/>
+          </a:fillRef>
+          <a:effectRef idx="0">
+            <a:schemeClr val="accent1"/>
+          </a:effectRef>
+          <a:fontRef idx="minor">
+            <a:schemeClr val="lt1"/>
+          </a:fontRef>
+        </p:style>
+        <p:txBody>
+          <a:bodyPr rtlCol="0" anchor="ctr"/>
+          <a:lstStyle/>
+          <a:p>
+            <a:pPr algn="ctr"/>
+            <a:r>
+              <a:rPr lang="en-US" dirty="0">
+                <a:solidFill>
+                  <a:schemeClr val="accent6">
+                    <a:lumMod val="50000"/>
+                  </a:schemeClr>
+                </a:solidFill>
+              </a:rPr>
+              <a:t>Extract Filter Logic</a:t>
+            </a:r>
+          </a:p>
+        </p:txBody>
+      </p:sp>
+      <p:cxnSp>
+        <p:nvCxnSpPr>
+          <p:cNvPr id="30" name="Straight Connector 29">
+            <a:extLst>
+              <a:ext uri="{FF2B5EF4-FFF2-40B4-BE49-F238E27FC236}">
+                <a16:creationId xmlns:a16="http://schemas.microsoft.com/office/drawing/2014/main" id="{8035BCF7-88E6-418C-8074-07CED4F04AD0}"/>
+              </a:ext>
+            </a:extLst>
+          </p:cNvPr>
+          <p:cNvCxnSpPr>
+            <a:cxnSpLocks noChangeAspect="1"/>
+            <a:stCxn id="99" idx="2"/>
+            <a:endCxn id="25" idx="0"/>
+          </p:cNvCxnSpPr>
+          <p:nvPr/>
+        </p:nvCxnSpPr>
+        <p:spPr>
+          <a:xfrm>
+            <a:off x="3519261" y="2719286"/>
+            <a:ext cx="489883" cy="2172492"/>
+          </a:xfrm>
+          <a:prstGeom prst="line">
+            <a:avLst/>
+          </a:prstGeom>
+          <a:ln w="15875">
+            <a:solidFill>
+              <a:schemeClr val="accent6">
+                <a:lumMod val="75000"/>
+              </a:schemeClr>
+            </a:solidFill>
+            <a:prstDash val="dash"/>
+          </a:ln>
+        </p:spPr>
+        <p:style>
+          <a:lnRef idx="1">
+            <a:schemeClr val="accent1"/>
+          </a:lnRef>
+          <a:fillRef idx="0">
+            <a:schemeClr val="accent1"/>
+          </a:fillRef>
+          <a:effectRef idx="0">
+            <a:schemeClr val="accent1"/>
+          </a:effectRef>
+          <a:fontRef idx="minor">
+            <a:schemeClr val="tx1"/>
+          </a:fontRef>
+        </p:style>
+      </p:cxnSp>
     </p:spTree>
     <p:extLst>
       <p:ext uri="{BB962C8B-B14F-4D97-AF65-F5344CB8AC3E}">

</xml_diff>